<commit_message>
Squashed 'AirfoilEditor_subtree/' changes from 5e49bdb..3cf51e5
3cf51e5 scale re
931c2f3 refactor subprocess call
b0edaf6 fix logging
d3dd408 preparing beta 2
2f2b164 popen Windows conditionals - thanks Thomas
b3e2570 blend SD7003 - thanks Thomas!
75d54b2 show polar op points
71735d4 refactor lazy polars
9903547 preparing v3.0
438e67e dev
defec42 preparing v3.0
89e40ca dev
73ad6e8 dev
c752bdf dev
518c034 dev
902d1dc dev
dcdf9f0 dev
54b52b2 dev
b48221a dev initial

git-subtree-dir: AirfoilEditor_subtree
git-subtree-split: 3cf51e5c4fd61299665b5d8ba4169af651aafbcd
</commit_message>
<xml_diff>
--- a/dev/UI_Drafts.pptx
+++ b/dev/UI_Drafts.pptx
@@ -5,11 +5,12 @@
     <p:sldMasterId id="2147483648" r:id="rId1"/>
   </p:sldMasterIdLst>
   <p:sldIdLst>
-    <p:sldId id="257" r:id="rId2"/>
-    <p:sldId id="258" r:id="rId3"/>
-    <p:sldId id="262" r:id="rId4"/>
-    <p:sldId id="263" r:id="rId5"/>
-    <p:sldId id="259" r:id="rId6"/>
+    <p:sldId id="259" r:id="rId2"/>
+    <p:sldId id="280" r:id="rId3"/>
+    <p:sldId id="257" r:id="rId4"/>
+    <p:sldId id="258" r:id="rId5"/>
+    <p:sldId id="262" r:id="rId6"/>
+    <p:sldId id="263" r:id="rId7"/>
   </p:sldIdLst>
   <p:sldSz cx="12192000" cy="6858000"/>
   <p:notesSz cx="6858000" cy="9144000"/>
@@ -276,7 +277,7 @@
           <a:p>
             <a:fld id="{CE8103EF-6A06-4AFC-A2C6-FF5735AE5867}" type="datetimeFigureOut">
               <a:rPr lang="en-US" smtClean="0"/>
-              <a:t>9/1/2024</a:t>
+              <a:t>1/14/2025</a:t>
             </a:fld>
             <a:endParaRPr lang="en-US"/>
           </a:p>
@@ -476,7 +477,7 @@
           <a:p>
             <a:fld id="{CE8103EF-6A06-4AFC-A2C6-FF5735AE5867}" type="datetimeFigureOut">
               <a:rPr lang="en-US" smtClean="0"/>
-              <a:t>9/1/2024</a:t>
+              <a:t>1/14/2025</a:t>
             </a:fld>
             <a:endParaRPr lang="en-US"/>
           </a:p>
@@ -686,7 +687,7 @@
           <a:p>
             <a:fld id="{CE8103EF-6A06-4AFC-A2C6-FF5735AE5867}" type="datetimeFigureOut">
               <a:rPr lang="en-US" smtClean="0"/>
-              <a:t>9/1/2024</a:t>
+              <a:t>1/14/2025</a:t>
             </a:fld>
             <a:endParaRPr lang="en-US"/>
           </a:p>
@@ -886,7 +887,7 @@
           <a:p>
             <a:fld id="{CE8103EF-6A06-4AFC-A2C6-FF5735AE5867}" type="datetimeFigureOut">
               <a:rPr lang="en-US" smtClean="0"/>
-              <a:t>9/1/2024</a:t>
+              <a:t>1/14/2025</a:t>
             </a:fld>
             <a:endParaRPr lang="en-US"/>
           </a:p>
@@ -1162,7 +1163,7 @@
           <a:p>
             <a:fld id="{CE8103EF-6A06-4AFC-A2C6-FF5735AE5867}" type="datetimeFigureOut">
               <a:rPr lang="en-US" smtClean="0"/>
-              <a:t>9/1/2024</a:t>
+              <a:t>1/14/2025</a:t>
             </a:fld>
             <a:endParaRPr lang="en-US"/>
           </a:p>
@@ -1430,7 +1431,7 @@
           <a:p>
             <a:fld id="{CE8103EF-6A06-4AFC-A2C6-FF5735AE5867}" type="datetimeFigureOut">
               <a:rPr lang="en-US" smtClean="0"/>
-              <a:t>9/1/2024</a:t>
+              <a:t>1/14/2025</a:t>
             </a:fld>
             <a:endParaRPr lang="en-US"/>
           </a:p>
@@ -1845,7 +1846,7 @@
           <a:p>
             <a:fld id="{CE8103EF-6A06-4AFC-A2C6-FF5735AE5867}" type="datetimeFigureOut">
               <a:rPr lang="en-US" smtClean="0"/>
-              <a:t>9/1/2024</a:t>
+              <a:t>1/14/2025</a:t>
             </a:fld>
             <a:endParaRPr lang="en-US"/>
           </a:p>
@@ -1987,7 +1988,7 @@
           <a:p>
             <a:fld id="{CE8103EF-6A06-4AFC-A2C6-FF5735AE5867}" type="datetimeFigureOut">
               <a:rPr lang="en-US" smtClean="0"/>
-              <a:t>9/1/2024</a:t>
+              <a:t>1/14/2025</a:t>
             </a:fld>
             <a:endParaRPr lang="en-US"/>
           </a:p>
@@ -2100,7 +2101,7 @@
           <a:p>
             <a:fld id="{CE8103EF-6A06-4AFC-A2C6-FF5735AE5867}" type="datetimeFigureOut">
               <a:rPr lang="en-US" smtClean="0"/>
-              <a:t>9/1/2024</a:t>
+              <a:t>1/14/2025</a:t>
             </a:fld>
             <a:endParaRPr lang="en-US"/>
           </a:p>
@@ -2413,7 +2414,7 @@
           <a:p>
             <a:fld id="{CE8103EF-6A06-4AFC-A2C6-FF5735AE5867}" type="datetimeFigureOut">
               <a:rPr lang="en-US" smtClean="0"/>
-              <a:t>9/1/2024</a:t>
+              <a:t>1/14/2025</a:t>
             </a:fld>
             <a:endParaRPr lang="en-US"/>
           </a:p>
@@ -2702,7 +2703,7 @@
           <a:p>
             <a:fld id="{CE8103EF-6A06-4AFC-A2C6-FF5735AE5867}" type="datetimeFigureOut">
               <a:rPr lang="en-US" smtClean="0"/>
-              <a:t>9/1/2024</a:t>
+              <a:t>1/14/2025</a:t>
             </a:fld>
             <a:endParaRPr lang="en-US"/>
           </a:p>
@@ -2945,7 +2946,7 @@
           <a:p>
             <a:fld id="{CE8103EF-6A06-4AFC-A2C6-FF5735AE5867}" type="datetimeFigureOut">
               <a:rPr lang="en-US" smtClean="0"/>
-              <a:t>9/1/2024</a:t>
+              <a:t>1/14/2025</a:t>
             </a:fld>
             <a:endParaRPr lang="en-US"/>
           </a:p>
@@ -3348,6 +3349,579 @@
 <file path=ppt/slides/slide1.xml><?xml version="1.0" encoding="utf-8"?>
 <p:sld xmlns:a="http://schemas.openxmlformats.org/drawingml/2006/main" xmlns:r="http://schemas.openxmlformats.org/officeDocument/2006/relationships" xmlns:p="http://schemas.openxmlformats.org/presentationml/2006/main">
   <p:cSld>
+    <p:bg>
+      <p:bgPr>
+        <a:solidFill>
+          <a:schemeClr val="bg2">
+            <a:lumMod val="50000"/>
+          </a:schemeClr>
+        </a:solidFill>
+        <a:effectLst/>
+      </p:bgPr>
+    </p:bg>
+    <p:spTree>
+      <p:nvGrpSpPr>
+        <p:cNvPr id="1" name=""/>
+        <p:cNvGrpSpPr/>
+        <p:nvPr/>
+      </p:nvGrpSpPr>
+      <p:grpSpPr>
+        <a:xfrm>
+          <a:off x="0" y="0"/>
+          <a:ext cx="0" cy="0"/>
+          <a:chOff x="0" y="0"/>
+          <a:chExt cx="0" cy="0"/>
+        </a:xfrm>
+      </p:grpSpPr>
+      <p:pic>
+        <p:nvPicPr>
+          <p:cNvPr id="3" name="Grafik 2" descr="Ein Bild, das Schrift, Grafiken, Text, Grafikdesign enthält.&#10;&#10;Automatisch generierte Beschreibung">
+            <a:extLst>
+              <a:ext uri="{FF2B5EF4-FFF2-40B4-BE49-F238E27FC236}">
+                <a16:creationId xmlns:a16="http://schemas.microsoft.com/office/drawing/2014/main" id="{455BEB90-6115-17F0-07F2-8AAE37B7027D}"/>
+              </a:ext>
+            </a:extLst>
+          </p:cNvPr>
+          <p:cNvPicPr>
+            <a:picLocks noChangeAspect="1"/>
+          </p:cNvPicPr>
+          <p:nvPr/>
+        </p:nvPicPr>
+        <p:blipFill>
+          <a:blip r:embed="rId2">
+            <a:extLst>
+              <a:ext uri="{28A0092B-C50C-407E-A947-70E740481C1C}">
+                <a14:useLocalDpi xmlns:a14="http://schemas.microsoft.com/office/drawing/2010/main" val="0"/>
+              </a:ext>
+            </a:extLst>
+          </a:blip>
+          <a:stretch>
+            <a:fillRect/>
+          </a:stretch>
+        </p:blipFill>
+        <p:spPr>
+          <a:xfrm>
+            <a:off x="3115169" y="1382715"/>
+            <a:ext cx="4030349" cy="1151529"/>
+          </a:xfrm>
+          <a:prstGeom prst="rect">
+            <a:avLst/>
+          </a:prstGeom>
+        </p:spPr>
+      </p:pic>
+      <p:sp>
+        <p:nvSpPr>
+          <p:cNvPr id="4" name="Textfeld 3">
+            <a:extLst>
+              <a:ext uri="{FF2B5EF4-FFF2-40B4-BE49-F238E27FC236}">
+                <a16:creationId xmlns:a16="http://schemas.microsoft.com/office/drawing/2014/main" id="{88AE6C18-AD6C-B6B1-1B1C-9C53E33964EB}"/>
+              </a:ext>
+            </a:extLst>
+          </p:cNvPr>
+          <p:cNvSpPr txBox="1"/>
+          <p:nvPr/>
+        </p:nvSpPr>
+        <p:spPr>
+          <a:xfrm>
+            <a:off x="3115169" y="2875002"/>
+            <a:ext cx="5067297" cy="1107996"/>
+          </a:xfrm>
+          <a:prstGeom prst="rect">
+            <a:avLst/>
+          </a:prstGeom>
+          <a:solidFill>
+            <a:srgbClr val="101010"/>
+          </a:solidFill>
+        </p:spPr>
+        <p:txBody>
+          <a:bodyPr wrap="none" lIns="288000" rtlCol="0">
+            <a:noAutofit/>
+          </a:bodyPr>
+          <a:lstStyle/>
+          <a:p>
+            <a:r>
+              <a:rPr lang="de-DE" sz="6600" b="1" dirty="0">
+                <a:solidFill>
+                  <a:srgbClr val="D9D9D9"/>
+                </a:solidFill>
+                <a:latin typeface="Roboto Black" panose="02000000000000000000" pitchFamily="2" charset="0"/>
+                <a:ea typeface="Roboto Black" panose="02000000000000000000" pitchFamily="2" charset="0"/>
+              </a:rPr>
+              <a:t>Xoptfoil</a:t>
+            </a:r>
+          </a:p>
+        </p:txBody>
+      </p:sp>
+      <p:sp>
+        <p:nvSpPr>
+          <p:cNvPr id="5" name="Textfeld 4">
+            <a:extLst>
+              <a:ext uri="{FF2B5EF4-FFF2-40B4-BE49-F238E27FC236}">
+                <a16:creationId xmlns:a16="http://schemas.microsoft.com/office/drawing/2014/main" id="{516D9F68-55EA-89B5-B37B-3F6FBA25240E}"/>
+              </a:ext>
+            </a:extLst>
+          </p:cNvPr>
+          <p:cNvSpPr txBox="1"/>
+          <p:nvPr/>
+        </p:nvSpPr>
+        <p:spPr>
+          <a:xfrm>
+            <a:off x="3115168" y="4196326"/>
+            <a:ext cx="5265261" cy="1107996"/>
+          </a:xfrm>
+          <a:prstGeom prst="rect">
+            <a:avLst/>
+          </a:prstGeom>
+          <a:solidFill>
+            <a:srgbClr val="101010"/>
+          </a:solidFill>
+        </p:spPr>
+        <p:txBody>
+          <a:bodyPr wrap="none" lIns="288000" rtlCol="0">
+            <a:noAutofit/>
+          </a:bodyPr>
+          <a:lstStyle/>
+          <a:p>
+            <a:r>
+              <a:rPr lang="de-DE" sz="6600" b="1" dirty="0">
+                <a:solidFill>
+                  <a:srgbClr val="D9D9D9"/>
+                </a:solidFill>
+                <a:latin typeface="Roboto Black" panose="02000000000000000000" pitchFamily="2" charset="0"/>
+                <a:ea typeface="Roboto Black" panose="02000000000000000000" pitchFamily="2" charset="0"/>
+              </a:rPr>
+              <a:t>Airfoil</a:t>
+            </a:r>
+            <a:r>
+              <a:rPr lang="de-DE" sz="6600" b="1" dirty="0">
+                <a:solidFill>
+                  <a:srgbClr val="DA007D"/>
+                </a:solidFill>
+                <a:latin typeface="Roboto Black" panose="02000000000000000000" pitchFamily="2" charset="0"/>
+                <a:ea typeface="Roboto Black" panose="02000000000000000000" pitchFamily="2" charset="0"/>
+              </a:rPr>
+              <a:t>Editor</a:t>
+            </a:r>
+          </a:p>
+        </p:txBody>
+      </p:sp>
+    </p:spTree>
+    <p:extLst>
+      <p:ext uri="{BB962C8B-B14F-4D97-AF65-F5344CB8AC3E}">
+        <p14:creationId xmlns:p14="http://schemas.microsoft.com/office/powerpoint/2010/main" val="2102712342"/>
+      </p:ext>
+    </p:extLst>
+  </p:cSld>
+  <p:clrMapOvr>
+    <a:masterClrMapping/>
+  </p:clrMapOvr>
+</p:sld>
+</file>
+
+<file path=ppt/slides/slide2.xml><?xml version="1.0" encoding="utf-8"?>
+<p:sld xmlns:a="http://schemas.openxmlformats.org/drawingml/2006/main" xmlns:r="http://schemas.openxmlformats.org/officeDocument/2006/relationships" xmlns:p="http://schemas.openxmlformats.org/presentationml/2006/main">
+  <p:cSld>
+    <p:spTree>
+      <p:nvGrpSpPr>
+        <p:cNvPr id="1" name="">
+          <a:extLst>
+            <a:ext uri="{FF2B5EF4-FFF2-40B4-BE49-F238E27FC236}">
+              <a16:creationId xmlns:a16="http://schemas.microsoft.com/office/drawing/2014/main" id="{B22C1923-18A2-19FB-E666-97336C0E6A73}"/>
+            </a:ext>
+          </a:extLst>
+        </p:cNvPr>
+        <p:cNvGrpSpPr/>
+        <p:nvPr/>
+      </p:nvGrpSpPr>
+      <p:grpSpPr>
+        <a:xfrm>
+          <a:off x="0" y="0"/>
+          <a:ext cx="0" cy="0"/>
+          <a:chOff x="0" y="0"/>
+          <a:chExt cx="0" cy="0"/>
+        </a:xfrm>
+      </p:grpSpPr>
+      <p:pic>
+        <p:nvPicPr>
+          <p:cNvPr id="10" name="Grafik 9" descr="Ein Bild, das Screenshot, Text, Diagramm enthält.&#10;&#10;Automatisch generierte Beschreibung">
+            <a:extLst>
+              <a:ext uri="{FF2B5EF4-FFF2-40B4-BE49-F238E27FC236}">
+                <a16:creationId xmlns:a16="http://schemas.microsoft.com/office/drawing/2014/main" id="{78C36A17-93F4-C1C8-E83C-DEB088A8CE45}"/>
+              </a:ext>
+            </a:extLst>
+          </p:cNvPr>
+          <p:cNvPicPr>
+            <a:picLocks noChangeAspect="1"/>
+          </p:cNvPicPr>
+          <p:nvPr/>
+        </p:nvPicPr>
+        <p:blipFill>
+          <a:blip r:embed="rId2">
+            <a:extLst>
+              <a:ext uri="{28A0092B-C50C-407E-A947-70E740481C1C}">
+                <a14:useLocalDpi xmlns:a14="http://schemas.microsoft.com/office/drawing/2010/main" val="0"/>
+              </a:ext>
+            </a:extLst>
+          </a:blip>
+          <a:srcRect l="58106" t="46239" b="1731"/>
+          <a:stretch/>
+        </p:blipFill>
+        <p:spPr>
+          <a:xfrm>
+            <a:off x="2735580" y="1179147"/>
+            <a:ext cx="2635103" cy="1736597"/>
+          </a:xfrm>
+          <a:prstGeom prst="rect">
+            <a:avLst/>
+          </a:prstGeom>
+        </p:spPr>
+      </p:pic>
+      <p:sp>
+        <p:nvSpPr>
+          <p:cNvPr id="2" name="Textfeld 1">
+            <a:extLst>
+              <a:ext uri="{FF2B5EF4-FFF2-40B4-BE49-F238E27FC236}">
+                <a16:creationId xmlns:a16="http://schemas.microsoft.com/office/drawing/2014/main" id="{E481B723-64CE-6CD2-C126-C2EC26098A85}"/>
+              </a:ext>
+            </a:extLst>
+          </p:cNvPr>
+          <p:cNvSpPr txBox="1"/>
+          <p:nvPr/>
+        </p:nvSpPr>
+        <p:spPr>
+          <a:xfrm>
+            <a:off x="3230506" y="2755784"/>
+            <a:ext cx="1610917" cy="591424"/>
+          </a:xfrm>
+          <a:prstGeom prst="rect">
+            <a:avLst/>
+          </a:prstGeom>
+          <a:solidFill>
+            <a:schemeClr val="bg1">
+              <a:lumMod val="85000"/>
+            </a:schemeClr>
+          </a:solidFill>
+          <a:effectLst>
+            <a:outerShdw blurRad="50800" dist="38100" dir="2700000" algn="tl" rotWithShape="0">
+              <a:prstClr val="black">
+                <a:alpha val="40000"/>
+              </a:prstClr>
+            </a:outerShdw>
+          </a:effectLst>
+        </p:spPr>
+        <p:txBody>
+          <a:bodyPr wrap="none" lIns="0" tIns="36000" rIns="0" bIns="36000" rtlCol="0" anchor="ctr">
+            <a:noAutofit/>
+          </a:bodyPr>
+          <a:lstStyle/>
+          <a:p>
+            <a:pPr algn="ctr"/>
+            <a:r>
+              <a:rPr lang="de-DE" b="1" dirty="0">
+                <a:solidFill>
+                  <a:schemeClr val="tx1">
+                    <a:lumMod val="50000"/>
+                    <a:lumOff val="50000"/>
+                  </a:schemeClr>
+                </a:solidFill>
+                <a:latin typeface="Roboto Black" panose="02000000000000000000" pitchFamily="2" charset="0"/>
+                <a:ea typeface="Roboto Black" panose="02000000000000000000" pitchFamily="2" charset="0"/>
+              </a:rPr>
+              <a:t>Airfoil</a:t>
+            </a:r>
+            <a:r>
+              <a:rPr lang="de-DE" b="1" dirty="0">
+                <a:solidFill>
+                  <a:srgbClr val="DA007D"/>
+                </a:solidFill>
+                <a:latin typeface="Roboto Black" panose="02000000000000000000" pitchFamily="2" charset="0"/>
+                <a:ea typeface="Roboto Black" panose="02000000000000000000" pitchFamily="2" charset="0"/>
+              </a:rPr>
+              <a:t>Editor</a:t>
+            </a:r>
+          </a:p>
+        </p:txBody>
+      </p:sp>
+      <p:sp>
+        <p:nvSpPr>
+          <p:cNvPr id="22" name="Textfeld 21">
+            <a:extLst>
+              <a:ext uri="{FF2B5EF4-FFF2-40B4-BE49-F238E27FC236}">
+                <a16:creationId xmlns:a16="http://schemas.microsoft.com/office/drawing/2014/main" id="{5402AD51-D9EA-CF78-346D-A51253A58946}"/>
+              </a:ext>
+            </a:extLst>
+          </p:cNvPr>
+          <p:cNvSpPr txBox="1"/>
+          <p:nvPr/>
+        </p:nvSpPr>
+        <p:spPr>
+          <a:xfrm>
+            <a:off x="3929948" y="3515121"/>
+            <a:ext cx="913226" cy="230832"/>
+          </a:xfrm>
+          <a:prstGeom prst="rect">
+            <a:avLst/>
+          </a:prstGeom>
+          <a:noFill/>
+        </p:spPr>
+        <p:txBody>
+          <a:bodyPr wrap="square" rtlCol="0">
+            <a:spAutoFit/>
+          </a:bodyPr>
+          <a:lstStyle/>
+          <a:p>
+            <a:pPr algn="r"/>
+            <a:r>
+              <a:rPr lang="de-DE" sz="900" dirty="0">
+                <a:solidFill>
+                  <a:schemeClr val="tx1">
+                    <a:lumMod val="65000"/>
+                    <a:lumOff val="35000"/>
+                  </a:schemeClr>
+                </a:solidFill>
+                <a:latin typeface="Roboto" panose="02000000000000000000" pitchFamily="2" charset="0"/>
+                <a:ea typeface="Roboto" panose="02000000000000000000" pitchFamily="2" charset="0"/>
+                <a:cs typeface="Roboto" panose="02000000000000000000" pitchFamily="2" charset="0"/>
+              </a:rPr>
+              <a:t>Xfoil </a:t>
+            </a:r>
+            <a:r>
+              <a:rPr lang="de-DE" sz="900" dirty="0" err="1">
+                <a:solidFill>
+                  <a:schemeClr val="tx1">
+                    <a:lumMod val="65000"/>
+                    <a:lumOff val="35000"/>
+                  </a:schemeClr>
+                </a:solidFill>
+                <a:latin typeface="Roboto" panose="02000000000000000000" pitchFamily="2" charset="0"/>
+                <a:ea typeface="Roboto" panose="02000000000000000000" pitchFamily="2" charset="0"/>
+                <a:cs typeface="Roboto" panose="02000000000000000000" pitchFamily="2" charset="0"/>
+              </a:rPr>
+              <a:t>Polars</a:t>
+            </a:r>
+            <a:endParaRPr lang="en-US" sz="900" dirty="0">
+              <a:solidFill>
+                <a:schemeClr val="tx1">
+                  <a:lumMod val="65000"/>
+                  <a:lumOff val="35000"/>
+                </a:schemeClr>
+              </a:solidFill>
+              <a:latin typeface="Roboto" panose="02000000000000000000" pitchFamily="2" charset="0"/>
+              <a:ea typeface="Roboto" panose="02000000000000000000" pitchFamily="2" charset="0"/>
+              <a:cs typeface="Roboto" panose="02000000000000000000" pitchFamily="2" charset="0"/>
+            </a:endParaRPr>
+          </a:p>
+        </p:txBody>
+      </p:sp>
+      <p:cxnSp>
+        <p:nvCxnSpPr>
+          <p:cNvPr id="29" name="Gerade Verbindung mit Pfeil 28">
+            <a:extLst>
+              <a:ext uri="{FF2B5EF4-FFF2-40B4-BE49-F238E27FC236}">
+                <a16:creationId xmlns:a16="http://schemas.microsoft.com/office/drawing/2014/main" id="{A0A33CC2-7741-D29F-6C48-2B7EE19376AE}"/>
+              </a:ext>
+            </a:extLst>
+          </p:cNvPr>
+          <p:cNvCxnSpPr>
+            <a:cxnSpLocks/>
+          </p:cNvCxnSpPr>
+          <p:nvPr/>
+        </p:nvCxnSpPr>
+        <p:spPr>
+          <a:xfrm>
+            <a:off x="4934250" y="3368092"/>
+            <a:ext cx="335456" cy="175171"/>
+          </a:xfrm>
+          <a:prstGeom prst="straightConnector1">
+            <a:avLst/>
+          </a:prstGeom>
+          <a:ln w="12700">
+            <a:solidFill>
+              <a:schemeClr val="bg1">
+                <a:lumMod val="65000"/>
+              </a:schemeClr>
+            </a:solidFill>
+            <a:prstDash val="sysDash"/>
+            <a:headEnd type="none" w="med" len="med"/>
+            <a:tailEnd type="triangle" w="lg" len="lg"/>
+          </a:ln>
+        </p:spPr>
+        <p:style>
+          <a:lnRef idx="2">
+            <a:schemeClr val="accent1"/>
+          </a:lnRef>
+          <a:fillRef idx="0">
+            <a:schemeClr val="accent1"/>
+          </a:fillRef>
+          <a:effectRef idx="1">
+            <a:schemeClr val="accent1"/>
+          </a:effectRef>
+          <a:fontRef idx="minor">
+            <a:schemeClr val="tx1"/>
+          </a:fontRef>
+        </p:style>
+      </p:cxnSp>
+      <p:sp>
+        <p:nvSpPr>
+          <p:cNvPr id="30" name="Textfeld 29">
+            <a:extLst>
+              <a:ext uri="{FF2B5EF4-FFF2-40B4-BE49-F238E27FC236}">
+                <a16:creationId xmlns:a16="http://schemas.microsoft.com/office/drawing/2014/main" id="{03F469C6-9A7B-AA24-EEA5-BA4CA1872678}"/>
+              </a:ext>
+            </a:extLst>
+          </p:cNvPr>
+          <p:cNvSpPr txBox="1"/>
+          <p:nvPr/>
+        </p:nvSpPr>
+        <p:spPr>
+          <a:xfrm>
+            <a:off x="5308795" y="3303495"/>
+            <a:ext cx="945343" cy="645428"/>
+          </a:xfrm>
+          <a:prstGeom prst="rect">
+            <a:avLst/>
+          </a:prstGeom>
+          <a:solidFill>
+            <a:srgbClr val="ECECEC"/>
+          </a:solidFill>
+          <a:effectLst>
+            <a:outerShdw blurRad="50800" dist="38100" dir="2700000" algn="tl" rotWithShape="0">
+              <a:prstClr val="black">
+                <a:alpha val="40000"/>
+              </a:prstClr>
+            </a:outerShdw>
+          </a:effectLst>
+        </p:spPr>
+        <p:txBody>
+          <a:bodyPr wrap="none" lIns="0" tIns="36000" rIns="0" bIns="36000" rtlCol="0" anchor="t">
+            <a:noAutofit/>
+          </a:bodyPr>
+          <a:lstStyle/>
+          <a:p>
+            <a:pPr algn="ctr"/>
+            <a:r>
+              <a:rPr lang="de-DE" sz="1100" b="1" dirty="0">
+                <a:solidFill>
+                  <a:srgbClr val="DA007D"/>
+                </a:solidFill>
+                <a:latin typeface="Roboto Black" panose="02000000000000000000" pitchFamily="2" charset="0"/>
+                <a:ea typeface="Roboto Black" panose="02000000000000000000" pitchFamily="2" charset="0"/>
+              </a:rPr>
+              <a:t>Worker</a:t>
+            </a:r>
+          </a:p>
+        </p:txBody>
+      </p:sp>
+      <p:sp>
+        <p:nvSpPr>
+          <p:cNvPr id="19" name="Textfeld 18">
+            <a:extLst>
+              <a:ext uri="{FF2B5EF4-FFF2-40B4-BE49-F238E27FC236}">
+                <a16:creationId xmlns:a16="http://schemas.microsoft.com/office/drawing/2014/main" id="{BEF5B32F-AB91-D655-1F15-A2043150CF18}"/>
+              </a:ext>
+            </a:extLst>
+          </p:cNvPr>
+          <p:cNvSpPr txBox="1"/>
+          <p:nvPr/>
+        </p:nvSpPr>
+        <p:spPr>
+          <a:xfrm>
+            <a:off x="5385628" y="3543263"/>
+            <a:ext cx="818503" cy="348509"/>
+          </a:xfrm>
+          <a:prstGeom prst="rect">
+            <a:avLst/>
+          </a:prstGeom>
+          <a:solidFill>
+            <a:schemeClr val="bg1">
+              <a:alpha val="74000"/>
+            </a:schemeClr>
+          </a:solidFill>
+          <a:effectLst/>
+        </p:spPr>
+        <p:txBody>
+          <a:bodyPr wrap="none" lIns="0" tIns="36000" rIns="0" bIns="36000" rtlCol="0" anchor="ctr">
+            <a:noAutofit/>
+          </a:bodyPr>
+          <a:lstStyle/>
+          <a:p>
+            <a:pPr algn="ctr"/>
+            <a:r>
+              <a:rPr lang="de-DE" sz="1100" b="1" dirty="0">
+                <a:solidFill>
+                  <a:schemeClr val="accent3"/>
+                </a:solidFill>
+                <a:latin typeface="Roboto Black" panose="02000000000000000000" pitchFamily="2" charset="0"/>
+                <a:ea typeface="Roboto Black" panose="02000000000000000000" pitchFamily="2" charset="0"/>
+              </a:rPr>
+              <a:t>Xfoil</a:t>
+            </a:r>
+          </a:p>
+        </p:txBody>
+      </p:sp>
+      <p:cxnSp>
+        <p:nvCxnSpPr>
+          <p:cNvPr id="6" name="Gerade Verbindung mit Pfeil 5">
+            <a:extLst>
+              <a:ext uri="{FF2B5EF4-FFF2-40B4-BE49-F238E27FC236}">
+                <a16:creationId xmlns:a16="http://schemas.microsoft.com/office/drawing/2014/main" id="{0AC3C85C-C658-01E5-2F18-8333367475B2}"/>
+              </a:ext>
+            </a:extLst>
+          </p:cNvPr>
+          <p:cNvCxnSpPr>
+            <a:cxnSpLocks/>
+          </p:cNvCxnSpPr>
+          <p:nvPr/>
+        </p:nvCxnSpPr>
+        <p:spPr>
+          <a:xfrm flipH="1" flipV="1">
+            <a:off x="4815435" y="3467861"/>
+            <a:ext cx="397750" cy="241999"/>
+          </a:xfrm>
+          <a:prstGeom prst="straightConnector1">
+            <a:avLst/>
+          </a:prstGeom>
+          <a:ln w="38100">
+            <a:solidFill>
+              <a:schemeClr val="bg1">
+                <a:lumMod val="65000"/>
+              </a:schemeClr>
+            </a:solidFill>
+            <a:headEnd type="none" w="med" len="med"/>
+            <a:tailEnd type="triangle" w="lg" len="lg"/>
+          </a:ln>
+        </p:spPr>
+        <p:style>
+          <a:lnRef idx="2">
+            <a:schemeClr val="accent1"/>
+          </a:lnRef>
+          <a:fillRef idx="0">
+            <a:schemeClr val="accent1"/>
+          </a:fillRef>
+          <a:effectRef idx="1">
+            <a:schemeClr val="accent1"/>
+          </a:effectRef>
+          <a:fontRef idx="minor">
+            <a:schemeClr val="tx1"/>
+          </a:fontRef>
+        </p:style>
+      </p:cxnSp>
+    </p:spTree>
+    <p:extLst>
+      <p:ext uri="{BB962C8B-B14F-4D97-AF65-F5344CB8AC3E}">
+        <p14:creationId xmlns:p14="http://schemas.microsoft.com/office/powerpoint/2010/main" val="923941560"/>
+      </p:ext>
+    </p:extLst>
+  </p:cSld>
+  <p:clrMapOvr>
+    <a:masterClrMapping/>
+  </p:clrMapOvr>
+</p:sld>
+</file>
+
+<file path=ppt/slides/slide3.xml><?xml version="1.0" encoding="utf-8"?>
+<p:sld xmlns:a="http://schemas.openxmlformats.org/drawingml/2006/main" xmlns:r="http://schemas.openxmlformats.org/officeDocument/2006/relationships" xmlns:p="http://schemas.openxmlformats.org/presentationml/2006/main">
+  <p:cSld>
     <p:spTree>
       <p:nvGrpSpPr>
         <p:cNvPr id="1" name=""/>
@@ -9641,7 +10215,7 @@
 </p:sld>
 </file>
 
-<file path=ppt/slides/slide2.xml><?xml version="1.0" encoding="utf-8"?>
+<file path=ppt/slides/slide4.xml><?xml version="1.0" encoding="utf-8"?>
 <p:sld xmlns:a="http://schemas.openxmlformats.org/drawingml/2006/main" xmlns:r="http://schemas.openxmlformats.org/officeDocument/2006/relationships" xmlns:p="http://schemas.openxmlformats.org/presentationml/2006/main">
   <p:cSld>
     <p:spTree>
@@ -15428,7 +16002,7 @@
 </p:sld>
 </file>
 
-<file path=ppt/slides/slide3.xml><?xml version="1.0" encoding="utf-8"?>
+<file path=ppt/slides/slide5.xml><?xml version="1.0" encoding="utf-8"?>
 <p:sld xmlns:a="http://schemas.openxmlformats.org/drawingml/2006/main" xmlns:r="http://schemas.openxmlformats.org/officeDocument/2006/relationships" xmlns:p="http://schemas.openxmlformats.org/presentationml/2006/main">
   <p:cSld>
     <p:spTree>
@@ -17224,7 +17798,7 @@
 </p:sld>
 </file>
 
-<file path=ppt/slides/slide4.xml><?xml version="1.0" encoding="utf-8"?>
+<file path=ppt/slides/slide6.xml><?xml version="1.0" encoding="utf-8"?>
 <p:sld xmlns:a="http://schemas.openxmlformats.org/drawingml/2006/main" xmlns:r="http://schemas.openxmlformats.org/officeDocument/2006/relationships" xmlns:p="http://schemas.openxmlformats.org/presentationml/2006/main">
   <p:cSld>
     <p:spTree>
@@ -18557,178 +19131,6 @@
     <p:extLst>
       <p:ext uri="{BB962C8B-B14F-4D97-AF65-F5344CB8AC3E}">
         <p14:creationId xmlns:p14="http://schemas.microsoft.com/office/powerpoint/2010/main" val="2933256252"/>
-      </p:ext>
-    </p:extLst>
-  </p:cSld>
-  <p:clrMapOvr>
-    <a:masterClrMapping/>
-  </p:clrMapOvr>
-</p:sld>
-</file>
-
-<file path=ppt/slides/slide5.xml><?xml version="1.0" encoding="utf-8"?>
-<p:sld xmlns:a="http://schemas.openxmlformats.org/drawingml/2006/main" xmlns:r="http://schemas.openxmlformats.org/officeDocument/2006/relationships" xmlns:p="http://schemas.openxmlformats.org/presentationml/2006/main">
-  <p:cSld>
-    <p:bg>
-      <p:bgPr>
-        <a:solidFill>
-          <a:schemeClr val="bg2">
-            <a:lumMod val="50000"/>
-          </a:schemeClr>
-        </a:solidFill>
-        <a:effectLst/>
-      </p:bgPr>
-    </p:bg>
-    <p:spTree>
-      <p:nvGrpSpPr>
-        <p:cNvPr id="1" name=""/>
-        <p:cNvGrpSpPr/>
-        <p:nvPr/>
-      </p:nvGrpSpPr>
-      <p:grpSpPr>
-        <a:xfrm>
-          <a:off x="0" y="0"/>
-          <a:ext cx="0" cy="0"/>
-          <a:chOff x="0" y="0"/>
-          <a:chExt cx="0" cy="0"/>
-        </a:xfrm>
-      </p:grpSpPr>
-      <p:pic>
-        <p:nvPicPr>
-          <p:cNvPr id="3" name="Grafik 2" descr="Ein Bild, das Schrift, Grafiken, Text, Grafikdesign enthält.&#10;&#10;Automatisch generierte Beschreibung">
-            <a:extLst>
-              <a:ext uri="{FF2B5EF4-FFF2-40B4-BE49-F238E27FC236}">
-                <a16:creationId xmlns:a16="http://schemas.microsoft.com/office/drawing/2014/main" id="{455BEB90-6115-17F0-07F2-8AAE37B7027D}"/>
-              </a:ext>
-            </a:extLst>
-          </p:cNvPr>
-          <p:cNvPicPr>
-            <a:picLocks noChangeAspect="1"/>
-          </p:cNvPicPr>
-          <p:nvPr/>
-        </p:nvPicPr>
-        <p:blipFill>
-          <a:blip r:embed="rId2">
-            <a:extLst>
-              <a:ext uri="{28A0092B-C50C-407E-A947-70E740481C1C}">
-                <a14:useLocalDpi xmlns:a14="http://schemas.microsoft.com/office/drawing/2010/main" val="0"/>
-              </a:ext>
-            </a:extLst>
-          </a:blip>
-          <a:stretch>
-            <a:fillRect/>
-          </a:stretch>
-        </p:blipFill>
-        <p:spPr>
-          <a:xfrm>
-            <a:off x="3115169" y="1382715"/>
-            <a:ext cx="4030349" cy="1151529"/>
-          </a:xfrm>
-          <a:prstGeom prst="rect">
-            <a:avLst/>
-          </a:prstGeom>
-        </p:spPr>
-      </p:pic>
-      <p:sp>
-        <p:nvSpPr>
-          <p:cNvPr id="4" name="Textfeld 3">
-            <a:extLst>
-              <a:ext uri="{FF2B5EF4-FFF2-40B4-BE49-F238E27FC236}">
-                <a16:creationId xmlns:a16="http://schemas.microsoft.com/office/drawing/2014/main" id="{88AE6C18-AD6C-B6B1-1B1C-9C53E33964EB}"/>
-              </a:ext>
-            </a:extLst>
-          </p:cNvPr>
-          <p:cNvSpPr txBox="1"/>
-          <p:nvPr/>
-        </p:nvSpPr>
-        <p:spPr>
-          <a:xfrm>
-            <a:off x="3115169" y="2875002"/>
-            <a:ext cx="5067297" cy="1107996"/>
-          </a:xfrm>
-          <a:prstGeom prst="rect">
-            <a:avLst/>
-          </a:prstGeom>
-          <a:solidFill>
-            <a:srgbClr val="101010"/>
-          </a:solidFill>
-        </p:spPr>
-        <p:txBody>
-          <a:bodyPr wrap="none" lIns="288000" rtlCol="0">
-            <a:noAutofit/>
-          </a:bodyPr>
-          <a:lstStyle/>
-          <a:p>
-            <a:r>
-              <a:rPr lang="de-DE" sz="6600" b="1" dirty="0">
-                <a:solidFill>
-                  <a:srgbClr val="D9D9D9"/>
-                </a:solidFill>
-                <a:latin typeface="Roboto Black" panose="02000000000000000000" pitchFamily="2" charset="0"/>
-                <a:ea typeface="Roboto Black" panose="02000000000000000000" pitchFamily="2" charset="0"/>
-              </a:rPr>
-              <a:t>Xoptfoil</a:t>
-            </a:r>
-          </a:p>
-        </p:txBody>
-      </p:sp>
-      <p:sp>
-        <p:nvSpPr>
-          <p:cNvPr id="5" name="Textfeld 4">
-            <a:extLst>
-              <a:ext uri="{FF2B5EF4-FFF2-40B4-BE49-F238E27FC236}">
-                <a16:creationId xmlns:a16="http://schemas.microsoft.com/office/drawing/2014/main" id="{516D9F68-55EA-89B5-B37B-3F6FBA25240E}"/>
-              </a:ext>
-            </a:extLst>
-          </p:cNvPr>
-          <p:cNvSpPr txBox="1"/>
-          <p:nvPr/>
-        </p:nvSpPr>
-        <p:spPr>
-          <a:xfrm>
-            <a:off x="3115168" y="4196326"/>
-            <a:ext cx="5265261" cy="1107996"/>
-          </a:xfrm>
-          <a:prstGeom prst="rect">
-            <a:avLst/>
-          </a:prstGeom>
-          <a:solidFill>
-            <a:srgbClr val="101010"/>
-          </a:solidFill>
-        </p:spPr>
-        <p:txBody>
-          <a:bodyPr wrap="none" lIns="288000" rtlCol="0">
-            <a:noAutofit/>
-          </a:bodyPr>
-          <a:lstStyle/>
-          <a:p>
-            <a:r>
-              <a:rPr lang="de-DE" sz="6600" b="1" dirty="0">
-                <a:solidFill>
-                  <a:srgbClr val="D9D9D9"/>
-                </a:solidFill>
-                <a:latin typeface="Roboto Black" panose="02000000000000000000" pitchFamily="2" charset="0"/>
-                <a:ea typeface="Roboto Black" panose="02000000000000000000" pitchFamily="2" charset="0"/>
-              </a:rPr>
-              <a:t>Airfoil</a:t>
-            </a:r>
-            <a:r>
-              <a:rPr lang="de-DE" sz="6600" b="1" dirty="0">
-                <a:solidFill>
-                  <a:srgbClr val="DA007D"/>
-                </a:solidFill>
-                <a:latin typeface="Roboto Black" panose="02000000000000000000" pitchFamily="2" charset="0"/>
-                <a:ea typeface="Roboto Black" panose="02000000000000000000" pitchFamily="2" charset="0"/>
-              </a:rPr>
-              <a:t>Editor</a:t>
-            </a:r>
-          </a:p>
-        </p:txBody>
-      </p:sp>
-    </p:spTree>
-    <p:extLst>
-      <p:ext uri="{BB962C8B-B14F-4D97-AF65-F5344CB8AC3E}">
-        <p14:creationId xmlns:p14="http://schemas.microsoft.com/office/powerpoint/2010/main" val="2102712342"/>
       </p:ext>
     </p:extLst>
   </p:cSld>

</xml_diff>